<commit_message>
update protyp 1 ppt
</commit_message>
<xml_diff>
--- a/Prototyp1.pptx
+++ b/Prototyp1.pptx
@@ -5,12 +5,13 @@
     <p:sldMasterId id="2147483648" r:id="rId1"/>
   </p:sldMasterIdLst>
   <p:notesMasterIdLst>
-    <p:notesMasterId r:id="rId5"/>
+    <p:notesMasterId r:id="rId6"/>
   </p:notesMasterIdLst>
   <p:sldIdLst>
     <p:sldId id="256" r:id="rId2"/>
     <p:sldId id="258" r:id="rId3"/>
     <p:sldId id="259" r:id="rId4"/>
+    <p:sldId id="260" r:id="rId5"/>
   </p:sldIdLst>
   <p:sldSz cx="12192000" cy="6858000"/>
   <p:notesSz cx="6858000" cy="9144000"/>
@@ -109,6 +110,11 @@
       </a:defRPr>
     </a:lvl9pPr>
   </p:defaultTextStyle>
+  <p:extLst>
+    <p:ext uri="{EFAFB233-063F-42B5-8137-9DF3F51BA10A}">
+      <p15:sldGuideLst xmlns:p15="http://schemas.microsoft.com/office/powerpoint/2012/main"/>
+    </p:ext>
+  </p:extLst>
 </p:presentation>
 </file>
 
@@ -194,7 +200,7 @@
           <a:p>
             <a:fld id="{3A3A1DF8-23A3-46DB-B035-418620AB69C2}" type="datetimeFigureOut">
               <a:rPr lang="de-DE" smtClean="0"/>
-              <a:t>29.11.2017</a:t>
+              <a:t>30.11.2017</a:t>
             </a:fld>
             <a:endParaRPr lang="de-DE"/>
           </a:p>
@@ -695,7 +701,7 @@
           <a:p>
             <a:fld id="{251956F7-B580-4B02-86DD-5D5AAE14691D}" type="datetimeFigureOut">
               <a:rPr lang="de-DE" smtClean="0"/>
-              <a:t>29.11.2017</a:t>
+              <a:t>30.11.2017</a:t>
             </a:fld>
             <a:endParaRPr lang="de-DE"/>
           </a:p>
@@ -893,7 +899,7 @@
           <a:p>
             <a:fld id="{251956F7-B580-4B02-86DD-5D5AAE14691D}" type="datetimeFigureOut">
               <a:rPr lang="de-DE" smtClean="0"/>
-              <a:t>29.11.2017</a:t>
+              <a:t>30.11.2017</a:t>
             </a:fld>
             <a:endParaRPr lang="de-DE"/>
           </a:p>
@@ -1101,7 +1107,7 @@
           <a:p>
             <a:fld id="{251956F7-B580-4B02-86DD-5D5AAE14691D}" type="datetimeFigureOut">
               <a:rPr lang="de-DE" smtClean="0"/>
-              <a:t>29.11.2017</a:t>
+              <a:t>30.11.2017</a:t>
             </a:fld>
             <a:endParaRPr lang="de-DE"/>
           </a:p>
@@ -1299,7 +1305,7 @@
           <a:p>
             <a:fld id="{251956F7-B580-4B02-86DD-5D5AAE14691D}" type="datetimeFigureOut">
               <a:rPr lang="de-DE" smtClean="0"/>
-              <a:t>29.11.2017</a:t>
+              <a:t>30.11.2017</a:t>
             </a:fld>
             <a:endParaRPr lang="de-DE"/>
           </a:p>
@@ -1574,7 +1580,7 @@
           <a:p>
             <a:fld id="{251956F7-B580-4B02-86DD-5D5AAE14691D}" type="datetimeFigureOut">
               <a:rPr lang="de-DE" smtClean="0"/>
-              <a:t>29.11.2017</a:t>
+              <a:t>30.11.2017</a:t>
             </a:fld>
             <a:endParaRPr lang="de-DE"/>
           </a:p>
@@ -1839,7 +1845,7 @@
           <a:p>
             <a:fld id="{251956F7-B580-4B02-86DD-5D5AAE14691D}" type="datetimeFigureOut">
               <a:rPr lang="de-DE" smtClean="0"/>
-              <a:t>29.11.2017</a:t>
+              <a:t>30.11.2017</a:t>
             </a:fld>
             <a:endParaRPr lang="de-DE"/>
           </a:p>
@@ -2251,7 +2257,7 @@
           <a:p>
             <a:fld id="{251956F7-B580-4B02-86DD-5D5AAE14691D}" type="datetimeFigureOut">
               <a:rPr lang="de-DE" smtClean="0"/>
-              <a:t>29.11.2017</a:t>
+              <a:t>30.11.2017</a:t>
             </a:fld>
             <a:endParaRPr lang="de-DE"/>
           </a:p>
@@ -2392,7 +2398,7 @@
           <a:p>
             <a:fld id="{251956F7-B580-4B02-86DD-5D5AAE14691D}" type="datetimeFigureOut">
               <a:rPr lang="de-DE" smtClean="0"/>
-              <a:t>29.11.2017</a:t>
+              <a:t>30.11.2017</a:t>
             </a:fld>
             <a:endParaRPr lang="de-DE"/>
           </a:p>
@@ -2505,7 +2511,7 @@
           <a:p>
             <a:fld id="{251956F7-B580-4B02-86DD-5D5AAE14691D}" type="datetimeFigureOut">
               <a:rPr lang="de-DE" smtClean="0"/>
-              <a:t>29.11.2017</a:t>
+              <a:t>30.11.2017</a:t>
             </a:fld>
             <a:endParaRPr lang="de-DE"/>
           </a:p>
@@ -2816,7 +2822,7 @@
           <a:p>
             <a:fld id="{251956F7-B580-4B02-86DD-5D5AAE14691D}" type="datetimeFigureOut">
               <a:rPr lang="de-DE" smtClean="0"/>
-              <a:t>29.11.2017</a:t>
+              <a:t>30.11.2017</a:t>
             </a:fld>
             <a:endParaRPr lang="de-DE"/>
           </a:p>
@@ -3104,7 +3110,7 @@
           <a:p>
             <a:fld id="{251956F7-B580-4B02-86DD-5D5AAE14691D}" type="datetimeFigureOut">
               <a:rPr lang="de-DE" smtClean="0"/>
-              <a:t>29.11.2017</a:t>
+              <a:t>30.11.2017</a:t>
             </a:fld>
             <a:endParaRPr lang="de-DE"/>
           </a:p>
@@ -3345,7 +3351,7 @@
           <a:p>
             <a:fld id="{251956F7-B580-4B02-86DD-5D5AAE14691D}" type="datetimeFigureOut">
               <a:rPr lang="de-DE" smtClean="0"/>
-              <a:t>29.11.2017</a:t>
+              <a:t>30.11.2017</a:t>
             </a:fld>
             <a:endParaRPr lang="de-DE"/>
           </a:p>
@@ -9446,6 +9452,171 @@
     <p:extLst>
       <p:ext uri="{BB962C8B-B14F-4D97-AF65-F5344CB8AC3E}">
         <p14:creationId xmlns:p14="http://schemas.microsoft.com/office/powerpoint/2010/main" val="284537673"/>
+      </p:ext>
+    </p:extLst>
+  </p:cSld>
+  <p:clrMapOvr>
+    <a:masterClrMapping/>
+  </p:clrMapOvr>
+</p:sld>
+</file>
+
+<file path=ppt/slides/slide4.xml><?xml version="1.0" encoding="utf-8"?>
+<p:sld xmlns:a="http://schemas.openxmlformats.org/drawingml/2006/main" xmlns:r="http://schemas.openxmlformats.org/officeDocument/2006/relationships" xmlns:p="http://schemas.openxmlformats.org/presentationml/2006/main" show="0">
+  <p:cSld>
+    <p:spTree>
+      <p:nvGrpSpPr>
+        <p:cNvPr id="1" name=""/>
+        <p:cNvGrpSpPr/>
+        <p:nvPr/>
+      </p:nvGrpSpPr>
+      <p:grpSpPr>
+        <a:xfrm>
+          <a:off x="0" y="0"/>
+          <a:ext cx="0" cy="0"/>
+          <a:chOff x="0" y="0"/>
+          <a:chExt cx="0" cy="0"/>
+        </a:xfrm>
+      </p:grpSpPr>
+      <p:sp>
+        <p:nvSpPr>
+          <p:cNvPr id="3" name="Inhaltsplatzhalter 2">
+            <a:extLst>
+              <a:ext uri="{FF2B5EF4-FFF2-40B4-BE49-F238E27FC236}">
+                <a16:creationId xmlns:a16="http://schemas.microsoft.com/office/drawing/2014/main" id="{D210DCDD-EDDE-482E-846D-2D92C364D677}"/>
+              </a:ext>
+            </a:extLst>
+          </p:cNvPr>
+          <p:cNvSpPr>
+            <a:spLocks noGrp="1"/>
+          </p:cNvSpPr>
+          <p:nvPr>
+            <p:ph idx="1"/>
+          </p:nvPr>
+        </p:nvSpPr>
+        <p:spPr>
+          <a:xfrm>
+            <a:off x="838200" y="627529"/>
+            <a:ext cx="10515600" cy="5549434"/>
+          </a:xfrm>
+        </p:spPr>
+        <p:txBody>
+          <a:bodyPr>
+            <a:normAutofit/>
+          </a:bodyPr>
+          <a:lstStyle/>
+          <a:p>
+            <a:r>
+              <a:rPr lang="de-DE" dirty="0"/>
+              <a:t>Auswählen Begriff: Touch</a:t>
+            </a:r>
+          </a:p>
+          <a:p>
+            <a:pPr lvl="1"/>
+            <a:r>
+              <a:rPr lang="de-DE" dirty="0"/>
+              <a:t>Begriffsgröße </a:t>
+            </a:r>
+            <a:r>
+              <a:rPr lang="de-DE" dirty="0" err="1"/>
+              <a:t>abh.</a:t>
+            </a:r>
+            <a:r>
+              <a:rPr lang="de-DE" dirty="0"/>
+              <a:t> von Anzahl der Betrachtung</a:t>
+            </a:r>
+          </a:p>
+          <a:p>
+            <a:pPr lvl="1"/>
+            <a:r>
+              <a:rPr lang="de-DE" dirty="0"/>
+              <a:t>Abh. Begriff, dann Wörter oben rechts in die Ecke</a:t>
+            </a:r>
+          </a:p>
+          <a:p>
+            <a:pPr marL="457200" lvl="1" indent="0">
+              <a:buNone/>
+            </a:pPr>
+            <a:endParaRPr lang="de-DE" dirty="0"/>
+          </a:p>
+          <a:p>
+            <a:r>
+              <a:rPr lang="de-DE" dirty="0"/>
+              <a:t>Auswählen Foto: Touch</a:t>
+            </a:r>
+          </a:p>
+          <a:p>
+            <a:pPr lvl="1"/>
+            <a:r>
+              <a:rPr lang="de-DE" dirty="0"/>
+              <a:t>Rutscht in die Mitte und „</a:t>
+            </a:r>
+            <a:r>
+              <a:rPr lang="de-DE" dirty="0" err="1"/>
+              <a:t>bloppt</a:t>
+            </a:r>
+            <a:r>
+              <a:rPr lang="de-DE" dirty="0"/>
+              <a:t> auf</a:t>
+            </a:r>
+          </a:p>
+          <a:p>
+            <a:pPr marL="457200" lvl="1" indent="0">
+              <a:buNone/>
+            </a:pPr>
+            <a:endParaRPr lang="de-DE" dirty="0"/>
+          </a:p>
+          <a:p>
+            <a:r>
+              <a:rPr lang="de-DE" dirty="0"/>
+              <a:t>In Detail zwischen Bildern wechseln: </a:t>
+            </a:r>
+            <a:r>
+              <a:rPr lang="de-DE" dirty="0" err="1"/>
+              <a:t>Swipe</a:t>
+            </a:r>
+            <a:endParaRPr lang="de-DE" dirty="0"/>
+          </a:p>
+          <a:p>
+            <a:endParaRPr lang="de-DE" dirty="0"/>
+          </a:p>
+          <a:p>
+            <a:r>
+              <a:rPr lang="de-DE" dirty="0"/>
+              <a:t>Zurück:</a:t>
+            </a:r>
+          </a:p>
+          <a:p>
+            <a:pPr lvl="1"/>
+            <a:r>
+              <a:rPr lang="de-DE" dirty="0"/>
+              <a:t>Von Details zu Bilder: </a:t>
+            </a:r>
+            <a:r>
+              <a:rPr lang="de-DE" dirty="0" err="1"/>
+              <a:t>Pinch</a:t>
+            </a:r>
+            <a:endParaRPr lang="de-DE" dirty="0"/>
+          </a:p>
+          <a:p>
+            <a:pPr lvl="1"/>
+            <a:r>
+              <a:rPr lang="de-DE" dirty="0"/>
+              <a:t>Von Bildern zu Begriffen: 3-Finger-Ziehen</a:t>
+            </a:r>
+          </a:p>
+          <a:p>
+            <a:pPr marL="0" indent="0">
+              <a:buNone/>
+            </a:pPr>
+            <a:endParaRPr lang="de-DE" dirty="0"/>
+          </a:p>
+        </p:txBody>
+      </p:sp>
+    </p:spTree>
+    <p:extLst>
+      <p:ext uri="{BB962C8B-B14F-4D97-AF65-F5344CB8AC3E}">
+        <p14:creationId xmlns:p14="http://schemas.microsoft.com/office/powerpoint/2010/main" val="146211504"/>
       </p:ext>
     </p:extLst>
   </p:cSld>

</xml_diff>